<commit_message>
Changed Dev Guide for Logic component
</commit_message>
<xml_diff>
--- a/docs/diagrams/LogicComponentSequenceDiagram.pptx
+++ b/docs/diagrams/LogicComponentSequenceDiagram.pptx
@@ -208,7 +208,7 @@
           <a:p>
             <a:fld id="{F5CC4B3F-88C1-4FFA-B1B6-F41C21DC6924}" type="datetimeFigureOut">
               <a:rPr lang="en-US" smtClean="0"/>
-              <a:t>2/6/2017</a:t>
+              <a:t>3/23/17</a:t>
             </a:fld>
             <a:endParaRPr lang="en-US"/>
           </a:p>
@@ -657,7 +657,7 @@
           <a:p>
             <a:fld id="{78C97017-6FC3-485B-9764-EAC9E56C1D49}" type="datetimeFigureOut">
               <a:rPr lang="en-US" smtClean="0"/>
-              <a:t>2/6/2017</a:t>
+              <a:t>3/23/17</a:t>
             </a:fld>
             <a:endParaRPr lang="en-US"/>
           </a:p>
@@ -827,7 +827,7 @@
           <a:p>
             <a:fld id="{78C97017-6FC3-485B-9764-EAC9E56C1D49}" type="datetimeFigureOut">
               <a:rPr lang="en-US" smtClean="0"/>
-              <a:t>2/6/2017</a:t>
+              <a:t>3/23/17</a:t>
             </a:fld>
             <a:endParaRPr lang="en-US"/>
           </a:p>
@@ -1007,7 +1007,7 @@
           <a:p>
             <a:fld id="{78C97017-6FC3-485B-9764-EAC9E56C1D49}" type="datetimeFigureOut">
               <a:rPr lang="en-US" smtClean="0"/>
-              <a:t>2/6/2017</a:t>
+              <a:t>3/23/17</a:t>
             </a:fld>
             <a:endParaRPr lang="en-US"/>
           </a:p>
@@ -1177,7 +1177,7 @@
           <a:p>
             <a:fld id="{78C97017-6FC3-485B-9764-EAC9E56C1D49}" type="datetimeFigureOut">
               <a:rPr lang="en-US" smtClean="0"/>
-              <a:t>2/6/2017</a:t>
+              <a:t>3/23/17</a:t>
             </a:fld>
             <a:endParaRPr lang="en-US"/>
           </a:p>
@@ -1423,7 +1423,7 @@
           <a:p>
             <a:fld id="{78C97017-6FC3-485B-9764-EAC9E56C1D49}" type="datetimeFigureOut">
               <a:rPr lang="en-US" smtClean="0"/>
-              <a:t>2/6/2017</a:t>
+              <a:t>3/23/17</a:t>
             </a:fld>
             <a:endParaRPr lang="en-US"/>
           </a:p>
@@ -1711,7 +1711,7 @@
           <a:p>
             <a:fld id="{78C97017-6FC3-485B-9764-EAC9E56C1D49}" type="datetimeFigureOut">
               <a:rPr lang="en-US" smtClean="0"/>
-              <a:t>2/6/2017</a:t>
+              <a:t>3/23/17</a:t>
             </a:fld>
             <a:endParaRPr lang="en-US"/>
           </a:p>
@@ -2133,7 +2133,7 @@
           <a:p>
             <a:fld id="{78C97017-6FC3-485B-9764-EAC9E56C1D49}" type="datetimeFigureOut">
               <a:rPr lang="en-US" smtClean="0"/>
-              <a:t>2/6/2017</a:t>
+              <a:t>3/23/17</a:t>
             </a:fld>
             <a:endParaRPr lang="en-US"/>
           </a:p>
@@ -2251,7 +2251,7 @@
           <a:p>
             <a:fld id="{78C97017-6FC3-485B-9764-EAC9E56C1D49}" type="datetimeFigureOut">
               <a:rPr lang="en-US" smtClean="0"/>
-              <a:t>2/6/2017</a:t>
+              <a:t>3/23/17</a:t>
             </a:fld>
             <a:endParaRPr lang="en-US"/>
           </a:p>
@@ -2346,7 +2346,7 @@
           <a:p>
             <a:fld id="{78C97017-6FC3-485B-9764-EAC9E56C1D49}" type="datetimeFigureOut">
               <a:rPr lang="en-US" smtClean="0"/>
-              <a:t>2/6/2017</a:t>
+              <a:t>3/23/17</a:t>
             </a:fld>
             <a:endParaRPr lang="en-US"/>
           </a:p>
@@ -2623,7 +2623,7 @@
           <a:p>
             <a:fld id="{78C97017-6FC3-485B-9764-EAC9E56C1D49}" type="datetimeFigureOut">
               <a:rPr lang="en-US" smtClean="0"/>
-              <a:t>2/6/2017</a:t>
+              <a:t>3/23/17</a:t>
             </a:fld>
             <a:endParaRPr lang="en-US"/>
           </a:p>
@@ -2876,7 +2876,7 @@
           <a:p>
             <a:fld id="{78C97017-6FC3-485B-9764-EAC9E56C1D49}" type="datetimeFigureOut">
               <a:rPr lang="en-US" smtClean="0"/>
-              <a:t>2/6/2017</a:t>
+              <a:t>3/23/17</a:t>
             </a:fld>
             <a:endParaRPr lang="en-US"/>
           </a:p>
@@ -3089,7 +3089,7 @@
           <a:p>
             <a:fld id="{78C97017-6FC3-485B-9764-EAC9E56C1D49}" type="datetimeFigureOut">
               <a:rPr lang="en-US" smtClean="0"/>
-              <a:t>2/6/2017</a:t>
+              <a:t>3/23/17</a:t>
             </a:fld>
             <a:endParaRPr lang="en-US"/>
           </a:p>
@@ -4691,7 +4691,7 @@
                   <a:srgbClr val="7030A0"/>
                 </a:solidFill>
               </a:rPr>
-              <a:t>deletePerson</a:t>
+              <a:t>deleteTask</a:t>
             </a:r>
             <a:r>
               <a:rPr lang="en-US" dirty="0" smtClean="0">
@@ -4699,7 +4699,15 @@
                   <a:srgbClr val="7030A0"/>
                 </a:solidFill>
               </a:rPr>
-              <a:t>(p)</a:t>
+              <a:t>(p</a:t>
+            </a:r>
+            <a:r>
+              <a:rPr lang="en-US" dirty="0" smtClean="0">
+                <a:solidFill>
+                  <a:srgbClr val="7030A0"/>
+                </a:solidFill>
+              </a:rPr>
+              <a:t>)</a:t>
             </a:r>
             <a:endParaRPr lang="en-US" dirty="0">
               <a:solidFill>

</xml_diff>